<commit_message>
code style checked and final test
</commit_message>
<xml_diff>
--- a/Definition_file_exmple.pptx
+++ b/Definition_file_exmple.pptx
@@ -245,7 +245,7 @@
           <a:p>
             <a:fld id="{6C301211-EBE6-4B7E-A724-3791FD54D0AA}" type="datetimeFigureOut">
               <a:rPr lang="en-GB" smtClean="0"/>
-              <a:t>03/06/2022</a:t>
+              <a:t>10/06/2022</a:t>
             </a:fld>
             <a:endParaRPr lang="en-GB"/>
           </a:p>
@@ -415,7 +415,7 @@
           <a:p>
             <a:fld id="{6C301211-EBE6-4B7E-A724-3791FD54D0AA}" type="datetimeFigureOut">
               <a:rPr lang="en-GB" smtClean="0"/>
-              <a:t>03/06/2022</a:t>
+              <a:t>10/06/2022</a:t>
             </a:fld>
             <a:endParaRPr lang="en-GB"/>
           </a:p>
@@ -595,7 +595,7 @@
           <a:p>
             <a:fld id="{6C301211-EBE6-4B7E-A724-3791FD54D0AA}" type="datetimeFigureOut">
               <a:rPr lang="en-GB" smtClean="0"/>
-              <a:t>03/06/2022</a:t>
+              <a:t>10/06/2022</a:t>
             </a:fld>
             <a:endParaRPr lang="en-GB"/>
           </a:p>
@@ -765,7 +765,7 @@
           <a:p>
             <a:fld id="{6C301211-EBE6-4B7E-A724-3791FD54D0AA}" type="datetimeFigureOut">
               <a:rPr lang="en-GB" smtClean="0"/>
-              <a:t>03/06/2022</a:t>
+              <a:t>10/06/2022</a:t>
             </a:fld>
             <a:endParaRPr lang="en-GB"/>
           </a:p>
@@ -1009,7 +1009,7 @@
           <a:p>
             <a:fld id="{6C301211-EBE6-4B7E-A724-3791FD54D0AA}" type="datetimeFigureOut">
               <a:rPr lang="en-GB" smtClean="0"/>
-              <a:t>03/06/2022</a:t>
+              <a:t>10/06/2022</a:t>
             </a:fld>
             <a:endParaRPr lang="en-GB"/>
           </a:p>
@@ -1241,7 +1241,7 @@
           <a:p>
             <a:fld id="{6C301211-EBE6-4B7E-A724-3791FD54D0AA}" type="datetimeFigureOut">
               <a:rPr lang="en-GB" smtClean="0"/>
-              <a:t>03/06/2022</a:t>
+              <a:t>10/06/2022</a:t>
             </a:fld>
             <a:endParaRPr lang="en-GB"/>
           </a:p>
@@ -1608,7 +1608,7 @@
           <a:p>
             <a:fld id="{6C301211-EBE6-4B7E-A724-3791FD54D0AA}" type="datetimeFigureOut">
               <a:rPr lang="en-GB" smtClean="0"/>
-              <a:t>03/06/2022</a:t>
+              <a:t>10/06/2022</a:t>
             </a:fld>
             <a:endParaRPr lang="en-GB"/>
           </a:p>
@@ -1726,7 +1726,7 @@
           <a:p>
             <a:fld id="{6C301211-EBE6-4B7E-A724-3791FD54D0AA}" type="datetimeFigureOut">
               <a:rPr lang="en-GB" smtClean="0"/>
-              <a:t>03/06/2022</a:t>
+              <a:t>10/06/2022</a:t>
             </a:fld>
             <a:endParaRPr lang="en-GB"/>
           </a:p>
@@ -1821,7 +1821,7 @@
           <a:p>
             <a:fld id="{6C301211-EBE6-4B7E-A724-3791FD54D0AA}" type="datetimeFigureOut">
               <a:rPr lang="en-GB" smtClean="0"/>
-              <a:t>03/06/2022</a:t>
+              <a:t>10/06/2022</a:t>
             </a:fld>
             <a:endParaRPr lang="en-GB"/>
           </a:p>
@@ -2098,7 +2098,7 @@
           <a:p>
             <a:fld id="{6C301211-EBE6-4B7E-A724-3791FD54D0AA}" type="datetimeFigureOut">
               <a:rPr lang="en-GB" smtClean="0"/>
-              <a:t>03/06/2022</a:t>
+              <a:t>10/06/2022</a:t>
             </a:fld>
             <a:endParaRPr lang="en-GB"/>
           </a:p>
@@ -2355,7 +2355,7 @@
           <a:p>
             <a:fld id="{6C301211-EBE6-4B7E-A724-3791FD54D0AA}" type="datetimeFigureOut">
               <a:rPr lang="en-GB" smtClean="0"/>
-              <a:t>03/06/2022</a:t>
+              <a:t>10/06/2022</a:t>
             </a:fld>
             <a:endParaRPr lang="en-GB"/>
           </a:p>
@@ -2568,7 +2568,7 @@
           <a:p>
             <a:fld id="{6C301211-EBE6-4B7E-A724-3791FD54D0AA}" type="datetimeFigureOut">
               <a:rPr lang="en-GB" smtClean="0"/>
-              <a:t>03/06/2022</a:t>
+              <a:t>10/06/2022</a:t>
             </a:fld>
             <a:endParaRPr lang="en-GB"/>
           </a:p>
@@ -2973,6 +2973,42 @@
           <a:chExt cx="0" cy="0"/>
         </a:xfrm>
       </p:grpSpPr>
+      <p:pic>
+        <p:nvPicPr>
+          <p:cNvPr id="4" name="Picture 3" descr="Chart, box and whisker chart&#10;&#10;Description automatically generated">
+            <a:extLst>
+              <a:ext uri="{FF2B5EF4-FFF2-40B4-BE49-F238E27FC236}">
+                <a16:creationId xmlns:a16="http://schemas.microsoft.com/office/drawing/2014/main" id="{90BADDF2-966F-EAAE-BE2A-5C55D5AFE454}"/>
+              </a:ext>
+            </a:extLst>
+          </p:cNvPr>
+          <p:cNvPicPr>
+            <a:picLocks noChangeAspect="1"/>
+          </p:cNvPicPr>
+          <p:nvPr/>
+        </p:nvPicPr>
+        <p:blipFill>
+          <a:blip r:embed="rId2">
+            <a:extLst>
+              <a:ext uri="{28A0092B-C50C-407E-A947-70E740481C1C}">
+                <a14:useLocalDpi xmlns:a14="http://schemas.microsoft.com/office/drawing/2010/main" val="0"/>
+              </a:ext>
+            </a:extLst>
+          </a:blip>
+          <a:stretch>
+            <a:fillRect/>
+          </a:stretch>
+        </p:blipFill>
+        <p:spPr>
+          <a:xfrm>
+            <a:off x="148900" y="1742763"/>
+            <a:ext cx="6603595" cy="3604204"/>
+          </a:xfrm>
+          <a:prstGeom prst="rect">
+            <a:avLst/>
+          </a:prstGeom>
+        </p:spPr>
+      </p:pic>
       <p:sp>
         <p:nvSpPr>
           <p:cNvPr id="2" name="Title 1">
@@ -3022,8 +3058,8 @@
         </p:nvSpPr>
         <p:spPr>
           <a:xfrm>
-            <a:off x="265556" y="702366"/>
-            <a:ext cx="5220844" cy="1169551"/>
+            <a:off x="265555" y="664266"/>
+            <a:ext cx="5797471" cy="1261884"/>
           </a:xfrm>
           <a:prstGeom prst="rect">
             <a:avLst/>
@@ -3037,7 +3073,7 @@
           <a:lstStyle/>
           <a:p>
             <a:r>
-              <a:rPr lang="en-GB" sz="1200" b="1" dirty="0"/>
+              <a:rPr lang="en-GB" sz="1100" b="1" dirty="0"/>
               <a:t>STEP 1: Getting Started</a:t>
             </a:r>
           </a:p>
@@ -3047,8 +3083,16 @@
               <a:buAutoNum type="arabicPeriod"/>
             </a:pPr>
             <a:r>
-              <a:rPr lang="en-GB" sz="1200" b="1" dirty="0"/>
-              <a:t>Navigate to the ‘logsim’ directory using the command line</a:t>
+              <a:rPr lang="en-GB" sz="1100" b="1" dirty="0"/>
+              <a:t>Navigate to the ‘</a:t>
+            </a:r>
+            <a:r>
+              <a:rPr lang="en-US" altLang="zh-CN" sz="1100" b="1" dirty="0"/>
+              <a:t>final</a:t>
+            </a:r>
+            <a:r>
+              <a:rPr lang="en-GB" sz="1100" b="1" dirty="0"/>
+              <a:t>’ directory using the command line</a:t>
             </a:r>
           </a:p>
           <a:p>
@@ -3057,8 +3101,8 @@
               <a:buAutoNum type="arabicPeriod"/>
             </a:pPr>
             <a:r>
-              <a:rPr lang="en-GB" sz="1200" b="1" dirty="0"/>
-              <a:t>Type ‘python logsim.py’ + definition file name (Definition_Ex3.txt can be used for illustration)</a:t>
+              <a:rPr lang="en-GB" sz="1100" b="1" dirty="0"/>
+              <a:t>Type ‘python3 logsim.py’ + definition file name (Definition_Ex3.txt can be used for illustration)</a:t>
             </a:r>
           </a:p>
           <a:p>
@@ -3067,8 +3111,18 @@
               <a:buAutoNum type="arabicPeriod"/>
             </a:pPr>
             <a:r>
-              <a:rPr lang="en-GB" sz="1200" b="1" dirty="0"/>
-              <a:t>press ENTER</a:t>
+              <a:rPr lang="en-GB" sz="1100" b="1" dirty="0"/>
+              <a:t>press ENTER with start the GUI with default language (English) according to the system</a:t>
+            </a:r>
+          </a:p>
+          <a:p>
+            <a:pPr marL="228600" indent="-228600">
+              <a:buFont typeface="+mj-lt"/>
+              <a:buAutoNum type="arabicPeriod"/>
+            </a:pPr>
+            <a:r>
+              <a:rPr lang="en-GB" sz="1100" b="1" dirty="0"/>
+              <a:t>For Simplified Chinese version: Type ‘LANG=zh_CN python3 logsim.py’ + definition file name</a:t>
             </a:r>
           </a:p>
           <a:p>
@@ -3076,36 +3130,6 @@
           </a:p>
         </p:txBody>
       </p:sp>
-      <p:pic>
-        <p:nvPicPr>
-          <p:cNvPr id="10" name="Picture 9">
-            <a:extLst>
-              <a:ext uri="{FF2B5EF4-FFF2-40B4-BE49-F238E27FC236}">
-                <a16:creationId xmlns:a16="http://schemas.microsoft.com/office/drawing/2014/main" id="{54C1197E-B04A-D8D0-C2D6-47F0D17BC6A0}"/>
-              </a:ext>
-            </a:extLst>
-          </p:cNvPr>
-          <p:cNvPicPr>
-            <a:picLocks noChangeAspect="1"/>
-          </p:cNvPicPr>
-          <p:nvPr/>
-        </p:nvPicPr>
-        <p:blipFill>
-          <a:blip r:embed="rId2"/>
-          <a:stretch>
-            <a:fillRect/>
-          </a:stretch>
-        </p:blipFill>
-        <p:spPr>
-          <a:xfrm>
-            <a:off x="265556" y="1725017"/>
-            <a:ext cx="5989983" cy="5225468"/>
-          </a:xfrm>
-          <a:prstGeom prst="rect">
-            <a:avLst/>
-          </a:prstGeom>
-        </p:spPr>
-      </p:pic>
       <p:sp>
         <p:nvSpPr>
           <p:cNvPr id="11" name="TextBox 10">
@@ -3120,8 +3144,8 @@
         </p:nvSpPr>
         <p:spPr>
           <a:xfrm>
-            <a:off x="221784" y="7378848"/>
-            <a:ext cx="5220844" cy="461665"/>
+            <a:off x="187000" y="5845032"/>
+            <a:ext cx="5220844" cy="430887"/>
           </a:xfrm>
           <a:prstGeom prst="rect">
             <a:avLst/>
@@ -3135,12 +3159,12 @@
           <a:lstStyle/>
           <a:p>
             <a:r>
-              <a:rPr lang="en-GB" sz="1400" b="1" dirty="0"/>
+              <a:rPr lang="en-GB" sz="1200" b="1" dirty="0"/>
               <a:t>STEP 2: GUI Familiarisation (see Figure 1) </a:t>
             </a:r>
           </a:p>
           <a:p>
-            <a:endParaRPr lang="en-GB" sz="1000" dirty="0"/>
+            <a:endParaRPr lang="en-GB" sz="900" dirty="0"/>
           </a:p>
         </p:txBody>
       </p:sp>
@@ -3158,7 +3182,7 @@
         </p:nvSpPr>
         <p:spPr>
           <a:xfrm>
-            <a:off x="2494945" y="6950485"/>
+            <a:off x="2401146" y="5383367"/>
             <a:ext cx="1868109" cy="461665"/>
           </a:xfrm>
           <a:prstGeom prst="rect">
@@ -3196,7 +3220,7 @@
         </p:nvSpPr>
         <p:spPr>
           <a:xfrm>
-            <a:off x="3278263" y="5906569"/>
+            <a:off x="3358872" y="4558534"/>
             <a:ext cx="2673675" cy="615553"/>
           </a:xfrm>
           <a:prstGeom prst="rect">
@@ -3241,7 +3265,7 @@
         </p:nvSpPr>
         <p:spPr>
           <a:xfrm>
-            <a:off x="2833573" y="4592245"/>
+            <a:off x="3543462" y="2906618"/>
             <a:ext cx="2953616" cy="615553"/>
           </a:xfrm>
           <a:prstGeom prst="rect">
@@ -3286,7 +3310,7 @@
         </p:nvSpPr>
         <p:spPr>
           <a:xfrm>
-            <a:off x="4615101" y="3403132"/>
+            <a:off x="3982099" y="3760386"/>
             <a:ext cx="871299" cy="530915"/>
           </a:xfrm>
           <a:prstGeom prst="rect">
@@ -3330,7 +3354,7 @@
         </p:nvSpPr>
         <p:spPr>
           <a:xfrm>
-            <a:off x="5360177" y="3995172"/>
+            <a:off x="2634781" y="3986428"/>
             <a:ext cx="871299" cy="530915"/>
           </a:xfrm>
           <a:prstGeom prst="rect">
@@ -3374,8 +3398,8 @@
         </p:nvSpPr>
         <p:spPr>
           <a:xfrm>
-            <a:off x="1891953" y="3464257"/>
-            <a:ext cx="871299" cy="692497"/>
+            <a:off x="1751165" y="3147454"/>
+            <a:ext cx="871299" cy="507831"/>
           </a:xfrm>
           <a:prstGeom prst="rect">
             <a:avLst/>
@@ -3389,7 +3413,7 @@
           <a:lstStyle/>
           <a:p>
             <a:r>
-              <a:rPr lang="en-GB" sz="1050" b="1" dirty="0">
+              <a:rPr lang="en-GB" sz="900" b="1" dirty="0">
                 <a:solidFill>
                   <a:schemeClr val="accent2">
                     <a:lumMod val="75000"/>
@@ -3418,8 +3442,8 @@
         </p:nvSpPr>
         <p:spPr>
           <a:xfrm>
-            <a:off x="3648564" y="1847268"/>
-            <a:ext cx="1212194" cy="530915"/>
+            <a:off x="2926132" y="2017610"/>
+            <a:ext cx="1212194" cy="507831"/>
           </a:xfrm>
           <a:prstGeom prst="rect">
             <a:avLst/>
@@ -3433,7 +3457,7 @@
           <a:lstStyle/>
           <a:p>
             <a:r>
-              <a:rPr lang="en-GB" sz="1050" b="1" dirty="0">
+              <a:rPr lang="en-GB" sz="900" b="1" dirty="0">
                 <a:solidFill>
                   <a:schemeClr val="accent2">
                     <a:lumMod val="75000"/>
@@ -3464,7 +3488,7 @@
         </p:nvCxnSpPr>
         <p:spPr>
           <a:xfrm>
-            <a:off x="4673161" y="2027049"/>
+            <a:off x="3888301" y="2128928"/>
             <a:ext cx="187597" cy="171352"/>
           </a:xfrm>
           <a:prstGeom prst="straightConnector1">
@@ -3503,8 +3527,8 @@
         </p:nvSpPr>
         <p:spPr>
           <a:xfrm>
-            <a:off x="679759" y="2198401"/>
-            <a:ext cx="1212194" cy="530915"/>
+            <a:off x="400489" y="2086491"/>
+            <a:ext cx="1212194" cy="507831"/>
           </a:xfrm>
           <a:prstGeom prst="rect">
             <a:avLst/>
@@ -3518,7 +3542,7 @@
           <a:lstStyle/>
           <a:p>
             <a:r>
-              <a:rPr lang="en-GB" sz="1050" b="1" dirty="0">
+              <a:rPr lang="en-GB" sz="900" b="1" dirty="0">
                 <a:solidFill>
                   <a:schemeClr val="accent2">
                     <a:lumMod val="75000"/>
@@ -3547,8 +3571,8 @@
         </p:nvSpPr>
         <p:spPr>
           <a:xfrm>
-            <a:off x="1093962" y="2590967"/>
-            <a:ext cx="1212194" cy="692497"/>
+            <a:off x="713310" y="2354153"/>
+            <a:ext cx="1212194" cy="646331"/>
           </a:xfrm>
           <a:prstGeom prst="rect">
             <a:avLst/>
@@ -3562,7 +3586,7 @@
           <a:lstStyle/>
           <a:p>
             <a:r>
-              <a:rPr lang="en-GB" sz="1050" b="1" dirty="0">
+              <a:rPr lang="en-GB" sz="900" b="1" dirty="0">
                 <a:solidFill>
                   <a:schemeClr val="accent2">
                     <a:lumMod val="75000"/>
@@ -3574,7 +3598,7 @@
           </a:p>
           <a:p>
             <a:r>
-              <a:rPr lang="en-GB" sz="1050" b="1" dirty="0">
+              <a:rPr lang="en-GB" sz="900" b="1" dirty="0">
                 <a:solidFill>
                   <a:schemeClr val="accent2">
                     <a:lumMod val="75000"/>
@@ -3603,7 +3627,7 @@
         </p:nvSpPr>
         <p:spPr>
           <a:xfrm>
-            <a:off x="602461" y="3750805"/>
+            <a:off x="188779" y="3187008"/>
             <a:ext cx="1212194" cy="253916"/>
           </a:xfrm>
           <a:prstGeom prst="rect">
@@ -3661,7 +3685,7 @@
         </p:nvSpPr>
         <p:spPr>
           <a:xfrm>
-            <a:off x="602461" y="5055336"/>
+            <a:off x="124408" y="3934047"/>
             <a:ext cx="1340935" cy="253916"/>
           </a:xfrm>
           <a:prstGeom prst="rect">
@@ -3719,8 +3743,8 @@
         </p:nvSpPr>
         <p:spPr>
           <a:xfrm>
-            <a:off x="430969" y="6013265"/>
-            <a:ext cx="2063976" cy="338554"/>
+            <a:off x="207977" y="5398250"/>
+            <a:ext cx="1631665" cy="276999"/>
           </a:xfrm>
           <a:prstGeom prst="rect">
             <a:avLst/>
@@ -3734,7 +3758,7 @@
           <a:lstStyle/>
           <a:p>
             <a:r>
-              <a:rPr lang="en-GB" sz="1600" b="1" dirty="0">
+              <a:rPr lang="en-GB" sz="1200" b="1" dirty="0">
                 <a:solidFill>
                   <a:schemeClr val="accent2">
                     <a:lumMod val="75000"/>
@@ -3744,7 +3768,7 @@
               </a:rPr>
               <a:t>Input panel</a:t>
             </a:r>
-            <a:endParaRPr lang="en-GB" dirty="0">
+            <a:endParaRPr lang="en-GB" sz="1400" dirty="0">
               <a:latin typeface="Arial Black" panose="020B0A04020102020204" pitchFamily="34" charset="0"/>
             </a:endParaRPr>
           </a:p>
@@ -3764,8 +3788,8 @@
         </p:nvSpPr>
         <p:spPr>
           <a:xfrm>
-            <a:off x="221783" y="7692330"/>
-            <a:ext cx="5408989" cy="1277273"/>
+            <a:off x="187000" y="6107266"/>
+            <a:ext cx="5408989" cy="1169551"/>
           </a:xfrm>
           <a:prstGeom prst="rect">
             <a:avLst/>
@@ -3779,7 +3803,7 @@
           <a:lstStyle/>
           <a:p>
             <a:r>
-              <a:rPr lang="en-GB" sz="1400" b="1" dirty="0"/>
+              <a:rPr lang="en-GB" sz="1200" b="1" dirty="0"/>
               <a:t>STEP 3: Set the Input</a:t>
             </a:r>
           </a:p>
@@ -3789,7 +3813,7 @@
               <a:buAutoNum type="arabicPeriod"/>
             </a:pPr>
             <a:r>
-              <a:rPr lang="en-GB" sz="1400" b="1" dirty="0"/>
+              <a:rPr lang="en-GB" sz="1200" b="1" dirty="0"/>
               <a:t>For each switch: set the initial input (0 or 1) by clicking the button</a:t>
             </a:r>
           </a:p>
@@ -3799,7 +3823,7 @@
               <a:buAutoNum type="arabicPeriod"/>
             </a:pPr>
             <a:r>
-              <a:rPr lang="en-GB" sz="1400" b="1" dirty="0"/>
+              <a:rPr lang="en-GB" sz="1200" b="1" dirty="0"/>
               <a:t>Choose the devices that need to be monitored </a:t>
             </a:r>
           </a:p>
@@ -3809,13 +3833,13 @@
               <a:buAutoNum type="arabicPeriod"/>
             </a:pPr>
             <a:r>
-              <a:rPr lang="en-GB" sz="1400" b="1" dirty="0"/>
+              <a:rPr lang="en-GB" sz="1200" b="1" dirty="0"/>
               <a:t>Set a time scale by typing or choosing the cycle number</a:t>
             </a:r>
           </a:p>
           <a:p>
             <a:r>
-              <a:rPr lang="en-GB" sz="1100" b="1" dirty="0"/>
+              <a:rPr lang="en-GB" sz="1200" b="1" dirty="0"/>
               <a:t>(All default values can be set in the definition file)</a:t>
             </a:r>
           </a:p>
@@ -3838,8 +3862,8 @@
         </p:nvSpPr>
         <p:spPr>
           <a:xfrm>
-            <a:off x="238457" y="8810131"/>
-            <a:ext cx="5824570" cy="1277273"/>
+            <a:off x="215597" y="7127532"/>
+            <a:ext cx="5824570" cy="1200329"/>
           </a:xfrm>
           <a:prstGeom prst="rect">
             <a:avLst/>
@@ -3853,7 +3877,7 @@
           <a:lstStyle/>
           <a:p>
             <a:r>
-              <a:rPr lang="en-GB" sz="1400" b="1" dirty="0"/>
+              <a:rPr lang="en-GB" sz="1200" b="1" dirty="0"/>
               <a:t>STEP 4: Run the Simulation</a:t>
             </a:r>
           </a:p>
@@ -3863,7 +3887,7 @@
               <a:buAutoNum type="arabicPeriod"/>
             </a:pPr>
             <a:r>
-              <a:rPr lang="en-GB" sz="1400" b="1" dirty="0"/>
+              <a:rPr lang="en-GB" sz="1200" b="1" dirty="0"/>
               <a:t>Click ‘Run’ button when you are ready</a:t>
             </a:r>
           </a:p>
@@ -3873,8 +3897,8 @@
               <a:buAutoNum type="arabicPeriod"/>
             </a:pPr>
             <a:r>
-              <a:rPr lang="en-GB" sz="1400" b="1" dirty="0"/>
-              <a:t>Use ‘Clear’ button to clear the canvas and the loaded file</a:t>
+              <a:rPr lang="en-GB" sz="1200" b="1" dirty="0"/>
+              <a:t>Use ‘Clear Text Box’ button to clear the loaded file</a:t>
             </a:r>
           </a:p>
           <a:p>
@@ -3883,15 +3907,15 @@
               <a:buAutoNum type="arabicPeriod"/>
             </a:pPr>
             <a:r>
-              <a:rPr lang="en-GB" sz="1400" b="1" dirty="0"/>
+              <a:rPr lang="en-GB" sz="1200" b="1" dirty="0"/>
               <a:t>Drag or zoom the output traces using the mouse and mouse wheel</a:t>
             </a:r>
           </a:p>
           <a:p>
-            <a:endParaRPr lang="en-GB" sz="1100" b="1" dirty="0"/>
-          </a:p>
-          <a:p>
-            <a:endParaRPr lang="en-GB" sz="1000" dirty="0"/>
+            <a:endParaRPr lang="en-GB" sz="1200" b="1" dirty="0"/>
+          </a:p>
+          <a:p>
+            <a:endParaRPr lang="en-GB" sz="1200" dirty="0"/>
           </a:p>
         </p:txBody>
       </p:sp>
@@ -3909,8 +3933,8 @@
         </p:nvSpPr>
         <p:spPr>
           <a:xfrm>
-            <a:off x="1250344" y="1687680"/>
-            <a:ext cx="1386103" cy="692497"/>
+            <a:off x="995195" y="1748353"/>
+            <a:ext cx="1386103" cy="646331"/>
           </a:xfrm>
           <a:prstGeom prst="rect">
             <a:avLst/>
@@ -3924,7 +3948,7 @@
           <a:lstStyle/>
           <a:p>
             <a:r>
-              <a:rPr lang="en-GB" sz="1050" b="1" dirty="0">
+              <a:rPr lang="en-GB" sz="900" b="1" dirty="0">
                 <a:solidFill>
                   <a:schemeClr val="accent2">
                     <a:lumMod val="75000"/>
@@ -3955,7 +3979,7 @@
         </p:nvCxnSpPr>
         <p:spPr>
           <a:xfrm flipH="1">
-            <a:off x="517358" y="1986314"/>
+            <a:off x="330496" y="1925354"/>
             <a:ext cx="732986" cy="0"/>
           </a:xfrm>
           <a:prstGeom prst="straightConnector1">
@@ -3980,12 +4004,53 @@
           </a:fontRef>
         </p:style>
       </p:cxnSp>
-      <p:sp>
-        <p:nvSpPr>
-          <p:cNvPr id="36" name="TextBox 35">
+      <p:cxnSp>
+        <p:nvCxnSpPr>
+          <p:cNvPr id="34" name="Straight Arrow Connector 33">
             <a:extLst>
               <a:ext uri="{FF2B5EF4-FFF2-40B4-BE49-F238E27FC236}">
-                <a16:creationId xmlns:a16="http://schemas.microsoft.com/office/drawing/2014/main" id="{D439D5FF-E215-89E9-FFC5-83011ECA9305}"/>
+                <a16:creationId xmlns:a16="http://schemas.microsoft.com/office/drawing/2014/main" id="{ED88A707-0886-29A4-D931-B37940E95B17}"/>
+              </a:ext>
+            </a:extLst>
+          </p:cNvPr>
+          <p:cNvCxnSpPr>
+            <a:cxnSpLocks/>
+          </p:cNvCxnSpPr>
+          <p:nvPr/>
+        </p:nvCxnSpPr>
+        <p:spPr>
+          <a:xfrm>
+            <a:off x="2370666" y="3341133"/>
+            <a:ext cx="187597" cy="171352"/>
+          </a:xfrm>
+          <a:prstGeom prst="straightConnector1">
+            <a:avLst/>
+          </a:prstGeom>
+          <a:ln>
+            <a:tailEnd type="triangle"/>
+          </a:ln>
+        </p:spPr>
+        <p:style>
+          <a:lnRef idx="1">
+            <a:schemeClr val="accent2"/>
+          </a:lnRef>
+          <a:fillRef idx="0">
+            <a:schemeClr val="accent2"/>
+          </a:fillRef>
+          <a:effectRef idx="0">
+            <a:schemeClr val="accent2"/>
+          </a:effectRef>
+          <a:fontRef idx="minor">
+            <a:schemeClr val="tx1"/>
+          </a:fontRef>
+        </p:style>
+      </p:cxnSp>
+      <p:sp>
+        <p:nvSpPr>
+          <p:cNvPr id="37" name="TextBox 36">
+            <a:extLst>
+              <a:ext uri="{FF2B5EF4-FFF2-40B4-BE49-F238E27FC236}">
+                <a16:creationId xmlns:a16="http://schemas.microsoft.com/office/drawing/2014/main" id="{DE65204F-1F4C-A2FA-1DE2-DF607F268334}"/>
               </a:ext>
             </a:extLst>
           </p:cNvPr>
@@ -3994,18 +4059,13 @@
         </p:nvSpPr>
         <p:spPr>
           <a:xfrm>
-            <a:off x="4975905" y="8810131"/>
-            <a:ext cx="1741990" cy="553998"/>
+            <a:off x="764493" y="4678483"/>
+            <a:ext cx="1340935" cy="507831"/>
           </a:xfrm>
           <a:prstGeom prst="rect">
             <a:avLst/>
           </a:prstGeom>
           <a:noFill/>
-          <a:ln>
-            <a:solidFill>
-              <a:srgbClr val="FF0000"/>
-            </a:solidFill>
-          </a:ln>
         </p:spPr>
         <p:txBody>
           <a:bodyPr wrap="square" rtlCol="0">
@@ -4013,19 +4073,173 @@
           </a:bodyPr>
           <a:lstStyle/>
           <a:p>
-            <a:pPr algn="ctr"/>
-            <a:r>
-              <a:rPr lang="en-GB" sz="1000" b="1" dirty="0"/>
-              <a:t>Example definition files and  </a:t>
-            </a:r>
-          </a:p>
-          <a:p>
-            <a:pPr algn="ctr"/>
-            <a:r>
-              <a:rPr lang="en-GB" sz="1000" b="1" dirty="0"/>
-              <a:t>corresponding circuits can be found on the next page</a:t>
-            </a:r>
-            <a:endParaRPr lang="en-GB" sz="700" dirty="0"/>
+            <a:r>
+              <a:rPr lang="en-GB" sz="900" b="1" dirty="0">
+                <a:solidFill>
+                  <a:schemeClr val="accent2">
+                    <a:lumMod val="75000"/>
+                  </a:schemeClr>
+                </a:solidFill>
+              </a:rPr>
+              <a:t>Maintenance connections</a:t>
+            </a:r>
+          </a:p>
+          <a:p>
+            <a:r>
+              <a:rPr lang="en-GB" sz="900" b="1" dirty="0">
+                <a:solidFill>
+                  <a:schemeClr val="accent2">
+                    <a:lumMod val="75000"/>
+                  </a:schemeClr>
+                </a:solidFill>
+              </a:rPr>
+              <a:t>feature</a:t>
+            </a:r>
+            <a:endParaRPr lang="en-GB" sz="1400" dirty="0">
+              <a:solidFill>
+                <a:schemeClr val="accent2">
+                  <a:lumMod val="75000"/>
+                </a:schemeClr>
+              </a:solidFill>
+            </a:endParaRPr>
+          </a:p>
+        </p:txBody>
+      </p:sp>
+      <p:sp>
+        <p:nvSpPr>
+          <p:cNvPr id="38" name="TextBox 37">
+            <a:extLst>
+              <a:ext uri="{FF2B5EF4-FFF2-40B4-BE49-F238E27FC236}">
+                <a16:creationId xmlns:a16="http://schemas.microsoft.com/office/drawing/2014/main" id="{BD74CACD-AA75-475B-30F4-D83768552F42}"/>
+              </a:ext>
+            </a:extLst>
+          </p:cNvPr>
+          <p:cNvSpPr txBox="1"/>
+          <p:nvPr/>
+        </p:nvSpPr>
+        <p:spPr>
+          <a:xfrm>
+            <a:off x="2797422" y="8257878"/>
+            <a:ext cx="3472479" cy="1754326"/>
+          </a:xfrm>
+          <a:prstGeom prst="rect">
+            <a:avLst/>
+          </a:prstGeom>
+          <a:noFill/>
+        </p:spPr>
+        <p:txBody>
+          <a:bodyPr wrap="square" rtlCol="0">
+            <a:spAutoFit/>
+          </a:bodyPr>
+          <a:lstStyle/>
+          <a:p>
+            <a:r>
+              <a:rPr lang="en-GB" sz="1200" b="1" dirty="0"/>
+              <a:t>Extra Connection Feature:</a:t>
+            </a:r>
+          </a:p>
+          <a:p>
+            <a:pPr marL="171450" indent="-171450">
+              <a:buFont typeface="Arial" panose="020B0604020202020204" pitchFamily="34" charset="0"/>
+              <a:buChar char="•"/>
+            </a:pPr>
+            <a:r>
+              <a:rPr lang="en-GB" sz="1200" b="1" dirty="0"/>
+              <a:t>During the simulation, extra connections can be made and exist connections can be removed.</a:t>
+            </a:r>
+          </a:p>
+          <a:p>
+            <a:pPr marL="171450" indent="-171450">
+              <a:buFont typeface="Arial" panose="020B0604020202020204" pitchFamily="34" charset="0"/>
+              <a:buChar char="•"/>
+            </a:pPr>
+            <a:r>
+              <a:rPr lang="en-GB" sz="1200" b="1" dirty="0"/>
+              <a:t>The available device outputs and inputs are listed in the dropdown menu for you to choose</a:t>
+            </a:r>
+          </a:p>
+          <a:p>
+            <a:r>
+              <a:rPr lang="en-GB" sz="1200" b="1" dirty="0"/>
+              <a:t>     (see Figure 2)</a:t>
+            </a:r>
+          </a:p>
+          <a:p>
+            <a:endParaRPr lang="en-GB" sz="1200" b="1" dirty="0"/>
+          </a:p>
+          <a:p>
+            <a:endParaRPr lang="en-GB" sz="1200" b="1" dirty="0"/>
+          </a:p>
+          <a:p>
+            <a:endParaRPr lang="en-GB" sz="1200" dirty="0"/>
+          </a:p>
+        </p:txBody>
+      </p:sp>
+      <p:pic>
+        <p:nvPicPr>
+          <p:cNvPr id="7" name="Picture 6">
+            <a:extLst>
+              <a:ext uri="{FF2B5EF4-FFF2-40B4-BE49-F238E27FC236}">
+                <a16:creationId xmlns:a16="http://schemas.microsoft.com/office/drawing/2014/main" id="{3F41E43F-FC1B-7972-C112-CD806F4D2D3F}"/>
+              </a:ext>
+            </a:extLst>
+          </p:cNvPr>
+          <p:cNvPicPr>
+            <a:picLocks noChangeAspect="1"/>
+          </p:cNvPicPr>
+          <p:nvPr/>
+        </p:nvPicPr>
+        <p:blipFill>
+          <a:blip r:embed="rId3"/>
+          <a:stretch>
+            <a:fillRect/>
+          </a:stretch>
+        </p:blipFill>
+        <p:spPr>
+          <a:xfrm>
+            <a:off x="1052294" y="8128430"/>
+            <a:ext cx="1069937" cy="1261088"/>
+          </a:xfrm>
+          <a:prstGeom prst="rect">
+            <a:avLst/>
+          </a:prstGeom>
+        </p:spPr>
+      </p:pic>
+      <p:sp>
+        <p:nvSpPr>
+          <p:cNvPr id="39" name="TextBox 38">
+            <a:extLst>
+              <a:ext uri="{FF2B5EF4-FFF2-40B4-BE49-F238E27FC236}">
+                <a16:creationId xmlns:a16="http://schemas.microsoft.com/office/drawing/2014/main" id="{66236378-764C-017F-0953-F261D09D902E}"/>
+              </a:ext>
+            </a:extLst>
+          </p:cNvPr>
+          <p:cNvSpPr txBox="1"/>
+          <p:nvPr/>
+        </p:nvSpPr>
+        <p:spPr>
+          <a:xfrm>
+            <a:off x="527102" y="9519761"/>
+            <a:ext cx="2329777" cy="307777"/>
+          </a:xfrm>
+          <a:prstGeom prst="rect">
+            <a:avLst/>
+          </a:prstGeom>
+          <a:noFill/>
+        </p:spPr>
+        <p:txBody>
+          <a:bodyPr wrap="square" rtlCol="0">
+            <a:spAutoFit/>
+          </a:bodyPr>
+          <a:lstStyle/>
+          <a:p>
+            <a:r>
+              <a:rPr lang="en-GB" sz="900" b="1" dirty="0"/>
+              <a:t>Figure 2 Dropdown menu for connection</a:t>
+            </a:r>
+          </a:p>
+          <a:p>
+            <a:endParaRPr lang="en-GB" sz="500" dirty="0"/>
           </a:p>
         </p:txBody>
       </p:sp>
@@ -5413,16 +5627,16 @@
 <file path=customXml/itemProps1.xml><?xml version="1.0" encoding="utf-8"?>
 <ds:datastoreItem xmlns:ds="http://schemas.openxmlformats.org/officeDocument/2006/customXml" ds:itemID="{35DD8668-721F-4E41-B142-1A38E43269EB}">
   <ds:schemaRefs>
+    <ds:schemaRef ds:uri="http://purl.org/dc/elements/1.1/"/>
+    <ds:schemaRef ds:uri="http://purl.org/dc/terms/"/>
+    <ds:schemaRef ds:uri="http://purl.org/dc/dcmitype/"/>
+    <ds:schemaRef ds:uri="http://www.w3.org/XML/1998/namespace"/>
+    <ds:schemaRef ds:uri="http://schemas.openxmlformats.org/package/2006/metadata/core-properties"/>
+    <ds:schemaRef ds:uri="http://schemas.microsoft.com/office/2006/documentManagement/types"/>
+    <ds:schemaRef ds:uri="12fdb591-3096-4adf-bd49-26d0ffa1211b"/>
+    <ds:schemaRef ds:uri="http://schemas.microsoft.com/office/infopath/2007/PartnerControls"/>
+    <ds:schemaRef ds:uri="535c38fa-c53a-4bf9-892c-458c56ce39a2"/>
     <ds:schemaRef ds:uri="http://schemas.microsoft.com/office/2006/metadata/properties"/>
-    <ds:schemaRef ds:uri="http://purl.org/dc/dcmitype/"/>
-    <ds:schemaRef ds:uri="http://purl.org/dc/elements/1.1/"/>
-    <ds:schemaRef ds:uri="535c38fa-c53a-4bf9-892c-458c56ce39a2"/>
-    <ds:schemaRef ds:uri="http://schemas.openxmlformats.org/package/2006/metadata/core-properties"/>
-    <ds:schemaRef ds:uri="12fdb591-3096-4adf-bd49-26d0ffa1211b"/>
-    <ds:schemaRef ds:uri="http://schemas.microsoft.com/office/2006/documentManagement/types"/>
-    <ds:schemaRef ds:uri="http://purl.org/dc/terms/"/>
-    <ds:schemaRef ds:uri="http://schemas.microsoft.com/office/infopath/2007/PartnerControls"/>
-    <ds:schemaRef ds:uri="http://www.w3.org/XML/1998/namespace"/>
   </ds:schemaRefs>
 </ds:datastoreItem>
 </file>

</xml_diff>